<commit_message>
Added some common issues
</commit_message>
<xml_diff>
--- a/Images.pptx
+++ b/Images.pptx
@@ -25,6 +25,12 @@
     <p:sldId id="272" r:id="rId19"/>
     <p:sldId id="273" r:id="rId20"/>
     <p:sldId id="274" r:id="rId21"/>
+    <p:sldId id="277" r:id="rId22"/>
+    <p:sldId id="278" r:id="rId23"/>
+    <p:sldId id="279" r:id="rId24"/>
+    <p:sldId id="280" r:id="rId25"/>
+    <p:sldId id="281" r:id="rId26"/>
+    <p:sldId id="282" r:id="rId27"/>
   </p:sldIdLst>
   <p:sldSz cx="12192000" cy="6858000"/>
   <p:notesSz cx="6858000" cy="9144000"/>
@@ -134,7 +140,7 @@
 <file path=ppt/revisionInfo.xml><?xml version="1.0" encoding="utf-8"?>
 <p1510:revInfo xmlns:a="http://schemas.openxmlformats.org/drawingml/2006/main" xmlns:r="http://schemas.openxmlformats.org/officeDocument/2006/relationships" xmlns:p1510="http://schemas.microsoft.com/office/powerpoint/2015/10/main">
   <p1510:revLst>
-    <p1510:client id="{E01E2104-2934-43C7-9658-C5C3204F4CFD}" v="83" dt="2021-06-18T08:01:35.945"/>
+    <p1510:client id="{E01E2104-2934-43C7-9658-C5C3204F4CFD}" v="95" dt="2021-06-18T14:05:24.738"/>
   </p1510:revLst>
 </p1510:revInfo>
 </file>
@@ -144,7 +150,7 @@
   <pc:docChgLst>
     <pc:chgData name="Matteo Tenti" userId="42a26a47-fb64-47ab-924f-d9e190d94f34" providerId="ADAL" clId="{E01E2104-2934-43C7-9658-C5C3204F4CFD}"/>
     <pc:docChg chg="undo redo custSel addSld delSld modSld sldOrd">
-      <pc:chgData name="Matteo Tenti" userId="42a26a47-fb64-47ab-924f-d9e190d94f34" providerId="ADAL" clId="{E01E2104-2934-43C7-9658-C5C3204F4CFD}" dt="2021-06-18T08:01:59.245" v="624" actId="14100"/>
+      <pc:chgData name="Matteo Tenti" userId="42a26a47-fb64-47ab-924f-d9e190d94f34" providerId="ADAL" clId="{E01E2104-2934-43C7-9658-C5C3204F4CFD}" dt="2021-06-18T14:05:33.293" v="826" actId="14100"/>
       <pc:docMkLst>
         <pc:docMk/>
       </pc:docMkLst>
@@ -1147,6 +1153,232 @@
             <ac:spMk id="16" creationId="{8C455F36-124A-4ED5-86A5-97D169417483}"/>
           </ac:spMkLst>
         </pc:spChg>
+      </pc:sldChg>
+      <pc:sldChg chg="modSp add mod">
+        <pc:chgData name="Matteo Tenti" userId="42a26a47-fb64-47ab-924f-d9e190d94f34" providerId="ADAL" clId="{E01E2104-2934-43C7-9658-C5C3204F4CFD}" dt="2021-06-18T14:01:48.215" v="786" actId="1076"/>
+        <pc:sldMkLst>
+          <pc:docMk/>
+          <pc:sldMk cId="3455005048" sldId="277"/>
+        </pc:sldMkLst>
+        <pc:spChg chg="mod">
+          <ac:chgData name="Matteo Tenti" userId="42a26a47-fb64-47ab-924f-d9e190d94f34" providerId="ADAL" clId="{E01E2104-2934-43C7-9658-C5C3204F4CFD}" dt="2021-06-18T14:01:48.215" v="786" actId="1076"/>
+          <ac:spMkLst>
+            <pc:docMk/>
+            <pc:sldMk cId="3455005048" sldId="277"/>
+            <ac:spMk id="4" creationId="{3969FE34-81B0-478E-A472-4D3469810F58}"/>
+          </ac:spMkLst>
+        </pc:spChg>
+        <pc:spChg chg="mod">
+          <ac:chgData name="Matteo Tenti" userId="42a26a47-fb64-47ab-924f-d9e190d94f34" providerId="ADAL" clId="{E01E2104-2934-43C7-9658-C5C3204F4CFD}" dt="2021-06-18T13:48:50.055" v="642" actId="1036"/>
+          <ac:spMkLst>
+            <pc:docMk/>
+            <pc:sldMk cId="3455005048" sldId="277"/>
+            <ac:spMk id="6" creationId="{015B3425-4CA8-4E68-85E7-6F13F217BA7F}"/>
+          </ac:spMkLst>
+        </pc:spChg>
+      </pc:sldChg>
+      <pc:sldChg chg="addSp modSp new mod">
+        <pc:chgData name="Matteo Tenti" userId="42a26a47-fb64-47ab-924f-d9e190d94f34" providerId="ADAL" clId="{E01E2104-2934-43C7-9658-C5C3204F4CFD}" dt="2021-06-18T14:02:31.421" v="793" actId="1076"/>
+        <pc:sldMkLst>
+          <pc:docMk/>
+          <pc:sldMk cId="432712783" sldId="278"/>
+        </pc:sldMkLst>
+        <pc:spChg chg="add mod">
+          <ac:chgData name="Matteo Tenti" userId="42a26a47-fb64-47ab-924f-d9e190d94f34" providerId="ADAL" clId="{E01E2104-2934-43C7-9658-C5C3204F4CFD}" dt="2021-06-18T14:02:17.033" v="791" actId="14100"/>
+          <ac:spMkLst>
+            <pc:docMk/>
+            <pc:sldMk cId="432712783" sldId="278"/>
+            <ac:spMk id="4" creationId="{7DB2C6F8-56AA-4476-ABC3-248322D1B6CF}"/>
+          </ac:spMkLst>
+        </pc:spChg>
+        <pc:spChg chg="add mod">
+          <ac:chgData name="Matteo Tenti" userId="42a26a47-fb64-47ab-924f-d9e190d94f34" providerId="ADAL" clId="{E01E2104-2934-43C7-9658-C5C3204F4CFD}" dt="2021-06-18T14:02:31.421" v="793" actId="1076"/>
+          <ac:spMkLst>
+            <pc:docMk/>
+            <pc:sldMk cId="432712783" sldId="278"/>
+            <ac:spMk id="5" creationId="{5F64D5B2-DA5F-4D57-B0B4-42E71F379AEB}"/>
+          </ac:spMkLst>
+        </pc:spChg>
+        <pc:picChg chg="add mod">
+          <ac:chgData name="Matteo Tenti" userId="42a26a47-fb64-47ab-924f-d9e190d94f34" providerId="ADAL" clId="{E01E2104-2934-43C7-9658-C5C3204F4CFD}" dt="2021-06-18T14:02:05.426" v="789" actId="1076"/>
+          <ac:picMkLst>
+            <pc:docMk/>
+            <pc:sldMk cId="432712783" sldId="278"/>
+            <ac:picMk id="3" creationId="{FCF5992A-C881-4E7A-9AE7-56D05C524274}"/>
+          </ac:picMkLst>
+        </pc:picChg>
+      </pc:sldChg>
+      <pc:sldChg chg="addSp modSp new mod">
+        <pc:chgData name="Matteo Tenti" userId="42a26a47-fb64-47ab-924f-d9e190d94f34" providerId="ADAL" clId="{E01E2104-2934-43C7-9658-C5C3204F4CFD}" dt="2021-06-18T14:02:58.424" v="797" actId="1076"/>
+        <pc:sldMkLst>
+          <pc:docMk/>
+          <pc:sldMk cId="4198950319" sldId="279"/>
+        </pc:sldMkLst>
+        <pc:spChg chg="add mod">
+          <ac:chgData name="Matteo Tenti" userId="42a26a47-fb64-47ab-924f-d9e190d94f34" providerId="ADAL" clId="{E01E2104-2934-43C7-9658-C5C3204F4CFD}" dt="2021-06-18T14:02:55.292" v="796" actId="14100"/>
+          <ac:spMkLst>
+            <pc:docMk/>
+            <pc:sldMk cId="4198950319" sldId="279"/>
+            <ac:spMk id="4" creationId="{6BFFE94A-AC16-4296-ACFC-4398FAA730AB}"/>
+          </ac:spMkLst>
+        </pc:spChg>
+        <pc:spChg chg="add mod">
+          <ac:chgData name="Matteo Tenti" userId="42a26a47-fb64-47ab-924f-d9e190d94f34" providerId="ADAL" clId="{E01E2104-2934-43C7-9658-C5C3204F4CFD}" dt="2021-06-18T14:02:58.424" v="797" actId="1076"/>
+          <ac:spMkLst>
+            <pc:docMk/>
+            <pc:sldMk cId="4198950319" sldId="279"/>
+            <ac:spMk id="5" creationId="{3CD5557E-33EB-4B04-96C2-58E707FF6FD2}"/>
+          </ac:spMkLst>
+        </pc:spChg>
+        <pc:picChg chg="add">
+          <ac:chgData name="Matteo Tenti" userId="42a26a47-fb64-47ab-924f-d9e190d94f34" providerId="ADAL" clId="{E01E2104-2934-43C7-9658-C5C3204F4CFD}" dt="2021-06-18T13:50:24.070" v="646" actId="22"/>
+          <ac:picMkLst>
+            <pc:docMk/>
+            <pc:sldMk cId="4198950319" sldId="279"/>
+            <ac:picMk id="3" creationId="{E041BF37-B745-4C59-8A45-E1972E6016C2}"/>
+          </ac:picMkLst>
+        </pc:picChg>
+      </pc:sldChg>
+      <pc:sldChg chg="addSp delSp modSp new mod">
+        <pc:chgData name="Matteo Tenti" userId="42a26a47-fb64-47ab-924f-d9e190d94f34" providerId="ADAL" clId="{E01E2104-2934-43C7-9658-C5C3204F4CFD}" dt="2021-06-18T14:03:46.096" v="814" actId="1076"/>
+        <pc:sldMkLst>
+          <pc:docMk/>
+          <pc:sldMk cId="3735036972" sldId="280"/>
+        </pc:sldMkLst>
+        <pc:spChg chg="add del mod">
+          <ac:chgData name="Matteo Tenti" userId="42a26a47-fb64-47ab-924f-d9e190d94f34" providerId="ADAL" clId="{E01E2104-2934-43C7-9658-C5C3204F4CFD}" dt="2021-06-18T14:03:26.874" v="808" actId="14100"/>
+          <ac:spMkLst>
+            <pc:docMk/>
+            <pc:sldMk cId="3735036972" sldId="280"/>
+            <ac:spMk id="4" creationId="{F23E9C8F-4169-4598-921E-FE9A3BC54B60}"/>
+          </ac:spMkLst>
+        </pc:spChg>
+        <pc:spChg chg="add del mod">
+          <ac:chgData name="Matteo Tenti" userId="42a26a47-fb64-47ab-924f-d9e190d94f34" providerId="ADAL" clId="{E01E2104-2934-43C7-9658-C5C3204F4CFD}" dt="2021-06-18T14:03:08.325" v="801" actId="478"/>
+          <ac:spMkLst>
+            <pc:docMk/>
+            <pc:sldMk cId="3735036972" sldId="280"/>
+            <ac:spMk id="5" creationId="{2DB4F439-2539-41B4-8DA6-60F6243DBF22}"/>
+          </ac:spMkLst>
+        </pc:spChg>
+        <pc:spChg chg="add mod">
+          <ac:chgData name="Matteo Tenti" userId="42a26a47-fb64-47ab-924f-d9e190d94f34" providerId="ADAL" clId="{E01E2104-2934-43C7-9658-C5C3204F4CFD}" dt="2021-06-18T14:03:46.096" v="814" actId="1076"/>
+          <ac:spMkLst>
+            <pc:docMk/>
+            <pc:sldMk cId="3735036972" sldId="280"/>
+            <ac:spMk id="6" creationId="{04D50A3A-9D99-4C7A-805E-8BC4C8D27553}"/>
+          </ac:spMkLst>
+        </pc:spChg>
+        <pc:picChg chg="add">
+          <ac:chgData name="Matteo Tenti" userId="42a26a47-fb64-47ab-924f-d9e190d94f34" providerId="ADAL" clId="{E01E2104-2934-43C7-9658-C5C3204F4CFD}" dt="2021-06-18T13:51:12.686" v="648" actId="22"/>
+          <ac:picMkLst>
+            <pc:docMk/>
+            <pc:sldMk cId="3735036972" sldId="280"/>
+            <ac:picMk id="3" creationId="{56859214-A811-4708-A980-E59CCA6AF6C6}"/>
+          </ac:picMkLst>
+        </pc:picChg>
+      </pc:sldChg>
+      <pc:sldChg chg="addSp modSp new mod">
+        <pc:chgData name="Matteo Tenti" userId="42a26a47-fb64-47ab-924f-d9e190d94f34" providerId="ADAL" clId="{E01E2104-2934-43C7-9658-C5C3204F4CFD}" dt="2021-06-18T14:05:21.488" v="823" actId="14100"/>
+        <pc:sldMkLst>
+          <pc:docMk/>
+          <pc:sldMk cId="3426759580" sldId="281"/>
+        </pc:sldMkLst>
+        <pc:spChg chg="add mod">
+          <ac:chgData name="Matteo Tenti" userId="42a26a47-fb64-47ab-924f-d9e190d94f34" providerId="ADAL" clId="{E01E2104-2934-43C7-9658-C5C3204F4CFD}" dt="2021-06-18T14:04:55.738" v="817" actId="14100"/>
+          <ac:spMkLst>
+            <pc:docMk/>
+            <pc:sldMk cId="3426759580" sldId="281"/>
+            <ac:spMk id="7" creationId="{9D0C8C5C-CD3E-4B14-9B66-CDDBEFCF341A}"/>
+          </ac:spMkLst>
+        </pc:spChg>
+        <pc:spChg chg="add mod">
+          <ac:chgData name="Matteo Tenti" userId="42a26a47-fb64-47ab-924f-d9e190d94f34" providerId="ADAL" clId="{E01E2104-2934-43C7-9658-C5C3204F4CFD}" dt="2021-06-18T14:05:06.972" v="820" actId="14100"/>
+          <ac:spMkLst>
+            <pc:docMk/>
+            <pc:sldMk cId="3426759580" sldId="281"/>
+            <ac:spMk id="8" creationId="{22CFF26D-3148-4C09-AED8-B0B1EEB09861}"/>
+          </ac:spMkLst>
+        </pc:spChg>
+        <pc:spChg chg="add mod">
+          <ac:chgData name="Matteo Tenti" userId="42a26a47-fb64-47ab-924f-d9e190d94f34" providerId="ADAL" clId="{E01E2104-2934-43C7-9658-C5C3204F4CFD}" dt="2021-06-18T14:05:21.488" v="823" actId="14100"/>
+          <ac:spMkLst>
+            <pc:docMk/>
+            <pc:sldMk cId="3426759580" sldId="281"/>
+            <ac:spMk id="9" creationId="{BA14C8F9-7190-4DA1-9395-7BBC57C4D16E}"/>
+          </ac:spMkLst>
+        </pc:spChg>
+        <pc:picChg chg="add mod modCrop">
+          <ac:chgData name="Matteo Tenti" userId="42a26a47-fb64-47ab-924f-d9e190d94f34" providerId="ADAL" clId="{E01E2104-2934-43C7-9658-C5C3204F4CFD}" dt="2021-06-18T13:56:38.919" v="769" actId="1036"/>
+          <ac:picMkLst>
+            <pc:docMk/>
+            <pc:sldMk cId="3426759580" sldId="281"/>
+            <ac:picMk id="3" creationId="{EB988955-EC5D-46D0-BF92-D44B5DF48A26}"/>
+          </ac:picMkLst>
+        </pc:picChg>
+        <pc:picChg chg="add mod modCrop">
+          <ac:chgData name="Matteo Tenti" userId="42a26a47-fb64-47ab-924f-d9e190d94f34" providerId="ADAL" clId="{E01E2104-2934-43C7-9658-C5C3204F4CFD}" dt="2021-06-18T13:56:38.919" v="769" actId="1036"/>
+          <ac:picMkLst>
+            <pc:docMk/>
+            <pc:sldMk cId="3426759580" sldId="281"/>
+            <ac:picMk id="4" creationId="{9999DBB9-EEAF-474F-970D-406FA69631A6}"/>
+          </ac:picMkLst>
+        </pc:picChg>
+        <pc:picChg chg="add mod">
+          <ac:chgData name="Matteo Tenti" userId="42a26a47-fb64-47ab-924f-d9e190d94f34" providerId="ADAL" clId="{E01E2104-2934-43C7-9658-C5C3204F4CFD}" dt="2021-06-18T13:56:38.919" v="769" actId="1036"/>
+          <ac:picMkLst>
+            <pc:docMk/>
+            <pc:sldMk cId="3426759580" sldId="281"/>
+            <ac:picMk id="6" creationId="{19ACAF54-132C-400E-AFCD-4AC7B4FCF3A6}"/>
+          </ac:picMkLst>
+        </pc:picChg>
+      </pc:sldChg>
+      <pc:sldChg chg="addSp delSp modSp new mod">
+        <pc:chgData name="Matteo Tenti" userId="42a26a47-fb64-47ab-924f-d9e190d94f34" providerId="ADAL" clId="{E01E2104-2934-43C7-9658-C5C3204F4CFD}" dt="2021-06-18T14:05:33.293" v="826" actId="14100"/>
+        <pc:sldMkLst>
+          <pc:docMk/>
+          <pc:sldMk cId="3443549195" sldId="282"/>
+        </pc:sldMkLst>
+        <pc:spChg chg="add mod">
+          <ac:chgData name="Matteo Tenti" userId="42a26a47-fb64-47ab-924f-d9e190d94f34" providerId="ADAL" clId="{E01E2104-2934-43C7-9658-C5C3204F4CFD}" dt="2021-06-18T14:05:33.293" v="826" actId="14100"/>
+          <ac:spMkLst>
+            <pc:docMk/>
+            <pc:sldMk cId="3443549195" sldId="282"/>
+            <ac:spMk id="9" creationId="{A4546008-C89F-4396-B041-DABB46948DA9}"/>
+          </ac:spMkLst>
+        </pc:spChg>
+        <pc:grpChg chg="add del mod">
+          <ac:chgData name="Matteo Tenti" userId="42a26a47-fb64-47ab-924f-d9e190d94f34" providerId="ADAL" clId="{E01E2104-2934-43C7-9658-C5C3204F4CFD}" dt="2021-06-18T13:59:58.875" v="783" actId="478"/>
+          <ac:grpSpMkLst>
+            <pc:docMk/>
+            <pc:sldMk cId="3443549195" sldId="282"/>
+            <ac:grpSpMk id="6" creationId="{042BBD8D-9256-4C81-BEFF-F62AE68B90C5}"/>
+          </ac:grpSpMkLst>
+        </pc:grpChg>
+        <pc:picChg chg="add mod">
+          <ac:chgData name="Matteo Tenti" userId="42a26a47-fb64-47ab-924f-d9e190d94f34" providerId="ADAL" clId="{E01E2104-2934-43C7-9658-C5C3204F4CFD}" dt="2021-06-18T13:58:38.707" v="778" actId="164"/>
+          <ac:picMkLst>
+            <pc:docMk/>
+            <pc:sldMk cId="3443549195" sldId="282"/>
+            <ac:picMk id="3" creationId="{45E706E4-7C05-4694-9E4D-15CF8090E2DA}"/>
+          </ac:picMkLst>
+        </pc:picChg>
+        <pc:picChg chg="add mod modCrop">
+          <ac:chgData name="Matteo Tenti" userId="42a26a47-fb64-47ab-924f-d9e190d94f34" providerId="ADAL" clId="{E01E2104-2934-43C7-9658-C5C3204F4CFD}" dt="2021-06-18T13:58:38.707" v="778" actId="164"/>
+          <ac:picMkLst>
+            <pc:docMk/>
+            <pc:sldMk cId="3443549195" sldId="282"/>
+            <ac:picMk id="5" creationId="{D29FCE1F-F2EB-453C-B51C-EE7D4A11893B}"/>
+          </ac:picMkLst>
+        </pc:picChg>
+        <pc:picChg chg="add mod">
+          <ac:chgData name="Matteo Tenti" userId="42a26a47-fb64-47ab-924f-d9e190d94f34" providerId="ADAL" clId="{E01E2104-2934-43C7-9658-C5C3204F4CFD}" dt="2021-06-18T14:00:03.661" v="785" actId="14100"/>
+          <ac:picMkLst>
+            <pc:docMk/>
+            <pc:sldMk cId="3443549195" sldId="282"/>
+            <ac:picMk id="8" creationId="{286F4236-19F5-49B1-8027-7E40A825BAD7}"/>
+          </ac:picMkLst>
+        </pc:picChg>
       </pc:sldChg>
     </pc:docChg>
   </pc:docChgLst>
@@ -7938,6 +8170,1096 @@
 </p:sld>
 </file>
 
+<file path=ppt/slides/slide21.xml><?xml version="1.0" encoding="utf-8"?>
+<p:sld xmlns:a="http://schemas.openxmlformats.org/drawingml/2006/main" xmlns:r="http://schemas.openxmlformats.org/officeDocument/2006/relationships" xmlns:p="http://schemas.openxmlformats.org/presentationml/2006/main">
+  <p:cSld>
+    <p:spTree>
+      <p:nvGrpSpPr>
+        <p:cNvPr id="1" name=""/>
+        <p:cNvGrpSpPr/>
+        <p:nvPr/>
+      </p:nvGrpSpPr>
+      <p:grpSpPr>
+        <a:xfrm>
+          <a:off x="0" y="0"/>
+          <a:ext cx="0" cy="0"/>
+          <a:chOff x="0" y="0"/>
+          <a:chExt cx="0" cy="0"/>
+        </a:xfrm>
+      </p:grpSpPr>
+      <p:pic>
+        <p:nvPicPr>
+          <p:cNvPr id="3" name="Picture 2">
+            <a:extLst>
+              <a:ext uri="{FF2B5EF4-FFF2-40B4-BE49-F238E27FC236}">
+                <a16:creationId xmlns:a16="http://schemas.microsoft.com/office/drawing/2014/main" id="{ED74294C-BD38-4A88-9EA8-B3DC84D77661}"/>
+              </a:ext>
+            </a:extLst>
+          </p:cNvPr>
+          <p:cNvPicPr>
+            <a:picLocks noChangeAspect="1"/>
+          </p:cNvPicPr>
+          <p:nvPr/>
+        </p:nvPicPr>
+        <p:blipFill>
+          <a:blip r:embed="rId2"/>
+          <a:stretch>
+            <a:fillRect/>
+          </a:stretch>
+        </p:blipFill>
+        <p:spPr>
+          <a:xfrm>
+            <a:off x="1539641" y="647557"/>
+            <a:ext cx="9112718" cy="5562886"/>
+          </a:xfrm>
+          <a:prstGeom prst="rect">
+            <a:avLst/>
+          </a:prstGeom>
+        </p:spPr>
+      </p:pic>
+      <p:sp>
+        <p:nvSpPr>
+          <p:cNvPr id="4" name="Rectangle 3">
+            <a:extLst>
+              <a:ext uri="{FF2B5EF4-FFF2-40B4-BE49-F238E27FC236}">
+                <a16:creationId xmlns:a16="http://schemas.microsoft.com/office/drawing/2014/main" id="{3969FE34-81B0-478E-A472-4D3469810F58}"/>
+              </a:ext>
+            </a:extLst>
+          </p:cNvPr>
+          <p:cNvSpPr/>
+          <p:nvPr/>
+        </p:nvSpPr>
+        <p:spPr>
+          <a:xfrm>
+            <a:off x="1925058" y="5895602"/>
+            <a:ext cx="2108461" cy="273403"/>
+          </a:xfrm>
+          <a:prstGeom prst="rect">
+            <a:avLst/>
+          </a:prstGeom>
+          <a:noFill/>
+          <a:ln w="38100">
+            <a:solidFill>
+              <a:srgbClr val="FF0000"/>
+            </a:solidFill>
+          </a:ln>
+        </p:spPr>
+        <p:style>
+          <a:lnRef idx="2">
+            <a:schemeClr val="accent1">
+              <a:shade val="50000"/>
+            </a:schemeClr>
+          </a:lnRef>
+          <a:fillRef idx="1">
+            <a:schemeClr val="accent1"/>
+          </a:fillRef>
+          <a:effectRef idx="0">
+            <a:schemeClr val="accent1"/>
+          </a:effectRef>
+          <a:fontRef idx="minor">
+            <a:schemeClr val="lt1"/>
+          </a:fontRef>
+        </p:style>
+        <p:txBody>
+          <a:bodyPr rtlCol="0" anchor="ctr"/>
+          <a:lstStyle/>
+          <a:p>
+            <a:pPr algn="ctr"/>
+            <a:endParaRPr lang="en-US"/>
+          </a:p>
+        </p:txBody>
+      </p:sp>
+      <p:sp>
+        <p:nvSpPr>
+          <p:cNvPr id="6" name="Arrow: Right 5">
+            <a:extLst>
+              <a:ext uri="{FF2B5EF4-FFF2-40B4-BE49-F238E27FC236}">
+                <a16:creationId xmlns:a16="http://schemas.microsoft.com/office/drawing/2014/main" id="{015B3425-4CA8-4E68-85E7-6F13F217BA7F}"/>
+              </a:ext>
+            </a:extLst>
+          </p:cNvPr>
+          <p:cNvSpPr/>
+          <p:nvPr/>
+        </p:nvSpPr>
+        <p:spPr>
+          <a:xfrm rot="380170">
+            <a:off x="862934" y="5646577"/>
+            <a:ext cx="919320" cy="498050"/>
+          </a:xfrm>
+          <a:prstGeom prst="rightArrow">
+            <a:avLst/>
+          </a:prstGeom>
+          <a:noFill/>
+          <a:ln w="38100">
+            <a:solidFill>
+              <a:srgbClr val="FF0000"/>
+            </a:solidFill>
+          </a:ln>
+        </p:spPr>
+        <p:style>
+          <a:lnRef idx="2">
+            <a:schemeClr val="accent1">
+              <a:shade val="50000"/>
+            </a:schemeClr>
+          </a:lnRef>
+          <a:fillRef idx="1">
+            <a:schemeClr val="accent1"/>
+          </a:fillRef>
+          <a:effectRef idx="0">
+            <a:schemeClr val="accent1"/>
+          </a:effectRef>
+          <a:fontRef idx="minor">
+            <a:schemeClr val="lt1"/>
+          </a:fontRef>
+        </p:style>
+        <p:txBody>
+          <a:bodyPr rtlCol="0" anchor="ctr"/>
+          <a:lstStyle/>
+          <a:p>
+            <a:pPr algn="ctr"/>
+            <a:r>
+              <a:rPr lang="it-IT" dirty="0">
+                <a:solidFill>
+                  <a:srgbClr val="FF0000"/>
+                </a:solidFill>
+              </a:rPr>
+              <a:t>click</a:t>
+            </a:r>
+            <a:endParaRPr lang="en-US" dirty="0">
+              <a:solidFill>
+                <a:srgbClr val="FF0000"/>
+              </a:solidFill>
+            </a:endParaRPr>
+          </a:p>
+        </p:txBody>
+      </p:sp>
+    </p:spTree>
+    <p:extLst>
+      <p:ext uri="{BB962C8B-B14F-4D97-AF65-F5344CB8AC3E}">
+        <p14:creationId xmlns:p14="http://schemas.microsoft.com/office/powerpoint/2010/main" val="3455005048"/>
+      </p:ext>
+    </p:extLst>
+  </p:cSld>
+  <p:clrMapOvr>
+    <a:masterClrMapping/>
+  </p:clrMapOvr>
+</p:sld>
+</file>
+
+<file path=ppt/slides/slide22.xml><?xml version="1.0" encoding="utf-8"?>
+<p:sld xmlns:a="http://schemas.openxmlformats.org/drawingml/2006/main" xmlns:r="http://schemas.openxmlformats.org/officeDocument/2006/relationships" xmlns:p="http://schemas.openxmlformats.org/presentationml/2006/main">
+  <p:cSld>
+    <p:spTree>
+      <p:nvGrpSpPr>
+        <p:cNvPr id="1" name=""/>
+        <p:cNvGrpSpPr/>
+        <p:nvPr/>
+      </p:nvGrpSpPr>
+      <p:grpSpPr>
+        <a:xfrm>
+          <a:off x="0" y="0"/>
+          <a:ext cx="0" cy="0"/>
+          <a:chOff x="0" y="0"/>
+          <a:chExt cx="0" cy="0"/>
+        </a:xfrm>
+      </p:grpSpPr>
+      <p:pic>
+        <p:nvPicPr>
+          <p:cNvPr id="3" name="Picture 2">
+            <a:extLst>
+              <a:ext uri="{FF2B5EF4-FFF2-40B4-BE49-F238E27FC236}">
+                <a16:creationId xmlns:a16="http://schemas.microsoft.com/office/drawing/2014/main" id="{FCF5992A-C881-4E7A-9AE7-56D05C524274}"/>
+              </a:ext>
+            </a:extLst>
+          </p:cNvPr>
+          <p:cNvPicPr>
+            <a:picLocks noChangeAspect="1"/>
+          </p:cNvPicPr>
+          <p:nvPr/>
+        </p:nvPicPr>
+        <p:blipFill>
+          <a:blip r:embed="rId2"/>
+          <a:stretch>
+            <a:fillRect/>
+          </a:stretch>
+        </p:blipFill>
+        <p:spPr>
+          <a:xfrm>
+            <a:off x="1342780" y="968248"/>
+            <a:ext cx="9506439" cy="4921503"/>
+          </a:xfrm>
+          <a:prstGeom prst="rect">
+            <a:avLst/>
+          </a:prstGeom>
+        </p:spPr>
+      </p:pic>
+      <p:sp>
+        <p:nvSpPr>
+          <p:cNvPr id="4" name="Rectangle 3">
+            <a:extLst>
+              <a:ext uri="{FF2B5EF4-FFF2-40B4-BE49-F238E27FC236}">
+                <a16:creationId xmlns:a16="http://schemas.microsoft.com/office/drawing/2014/main" id="{7DB2C6F8-56AA-4476-ABC3-248322D1B6CF}"/>
+              </a:ext>
+            </a:extLst>
+          </p:cNvPr>
+          <p:cNvSpPr/>
+          <p:nvPr/>
+        </p:nvSpPr>
+        <p:spPr>
+          <a:xfrm>
+            <a:off x="2199379" y="3721362"/>
+            <a:ext cx="1275342" cy="576318"/>
+          </a:xfrm>
+          <a:prstGeom prst="rect">
+            <a:avLst/>
+          </a:prstGeom>
+          <a:noFill/>
+          <a:ln w="38100">
+            <a:solidFill>
+              <a:srgbClr val="FF0000"/>
+            </a:solidFill>
+          </a:ln>
+        </p:spPr>
+        <p:style>
+          <a:lnRef idx="2">
+            <a:schemeClr val="accent1">
+              <a:shade val="50000"/>
+            </a:schemeClr>
+          </a:lnRef>
+          <a:fillRef idx="1">
+            <a:schemeClr val="accent1"/>
+          </a:fillRef>
+          <a:effectRef idx="0">
+            <a:schemeClr val="accent1"/>
+          </a:effectRef>
+          <a:fontRef idx="minor">
+            <a:schemeClr val="lt1"/>
+          </a:fontRef>
+        </p:style>
+        <p:txBody>
+          <a:bodyPr rtlCol="0" anchor="ctr"/>
+          <a:lstStyle/>
+          <a:p>
+            <a:pPr algn="ctr"/>
+            <a:endParaRPr lang="en-US"/>
+          </a:p>
+        </p:txBody>
+      </p:sp>
+      <p:sp>
+        <p:nvSpPr>
+          <p:cNvPr id="5" name="Arrow: Right 4">
+            <a:extLst>
+              <a:ext uri="{FF2B5EF4-FFF2-40B4-BE49-F238E27FC236}">
+                <a16:creationId xmlns:a16="http://schemas.microsoft.com/office/drawing/2014/main" id="{5F64D5B2-DA5F-4D57-B0B4-42E71F379AEB}"/>
+              </a:ext>
+            </a:extLst>
+          </p:cNvPr>
+          <p:cNvSpPr/>
+          <p:nvPr/>
+        </p:nvSpPr>
+        <p:spPr>
+          <a:xfrm rot="380170">
+            <a:off x="1167733" y="3462264"/>
+            <a:ext cx="919320" cy="498050"/>
+          </a:xfrm>
+          <a:prstGeom prst="rightArrow">
+            <a:avLst/>
+          </a:prstGeom>
+          <a:noFill/>
+          <a:ln w="38100">
+            <a:solidFill>
+              <a:srgbClr val="FF0000"/>
+            </a:solidFill>
+          </a:ln>
+        </p:spPr>
+        <p:style>
+          <a:lnRef idx="2">
+            <a:schemeClr val="accent1">
+              <a:shade val="50000"/>
+            </a:schemeClr>
+          </a:lnRef>
+          <a:fillRef idx="1">
+            <a:schemeClr val="accent1"/>
+          </a:fillRef>
+          <a:effectRef idx="0">
+            <a:schemeClr val="accent1"/>
+          </a:effectRef>
+          <a:fontRef idx="minor">
+            <a:schemeClr val="lt1"/>
+          </a:fontRef>
+        </p:style>
+        <p:txBody>
+          <a:bodyPr rtlCol="0" anchor="ctr"/>
+          <a:lstStyle/>
+          <a:p>
+            <a:pPr algn="ctr"/>
+            <a:r>
+              <a:rPr lang="it-IT" dirty="0">
+                <a:solidFill>
+                  <a:srgbClr val="FF0000"/>
+                </a:solidFill>
+              </a:rPr>
+              <a:t>click</a:t>
+            </a:r>
+            <a:endParaRPr lang="en-US" dirty="0">
+              <a:solidFill>
+                <a:srgbClr val="FF0000"/>
+              </a:solidFill>
+            </a:endParaRPr>
+          </a:p>
+        </p:txBody>
+      </p:sp>
+    </p:spTree>
+    <p:extLst>
+      <p:ext uri="{BB962C8B-B14F-4D97-AF65-F5344CB8AC3E}">
+        <p14:creationId xmlns:p14="http://schemas.microsoft.com/office/powerpoint/2010/main" val="432712783"/>
+      </p:ext>
+    </p:extLst>
+  </p:cSld>
+  <p:clrMapOvr>
+    <a:masterClrMapping/>
+  </p:clrMapOvr>
+</p:sld>
+</file>
+
+<file path=ppt/slides/slide23.xml><?xml version="1.0" encoding="utf-8"?>
+<p:sld xmlns:a="http://schemas.openxmlformats.org/drawingml/2006/main" xmlns:r="http://schemas.openxmlformats.org/officeDocument/2006/relationships" xmlns:p="http://schemas.openxmlformats.org/presentationml/2006/main">
+  <p:cSld>
+    <p:spTree>
+      <p:nvGrpSpPr>
+        <p:cNvPr id="1" name=""/>
+        <p:cNvGrpSpPr/>
+        <p:nvPr/>
+      </p:nvGrpSpPr>
+      <p:grpSpPr>
+        <a:xfrm>
+          <a:off x="0" y="0"/>
+          <a:ext cx="0" cy="0"/>
+          <a:chOff x="0" y="0"/>
+          <a:chExt cx="0" cy="0"/>
+        </a:xfrm>
+      </p:grpSpPr>
+      <p:pic>
+        <p:nvPicPr>
+          <p:cNvPr id="3" name="Picture 2">
+            <a:extLst>
+              <a:ext uri="{FF2B5EF4-FFF2-40B4-BE49-F238E27FC236}">
+                <a16:creationId xmlns:a16="http://schemas.microsoft.com/office/drawing/2014/main" id="{E041BF37-B745-4C59-8A45-E1972E6016C2}"/>
+              </a:ext>
+            </a:extLst>
+          </p:cNvPr>
+          <p:cNvPicPr>
+            <a:picLocks noChangeAspect="1"/>
+          </p:cNvPicPr>
+          <p:nvPr/>
+        </p:nvPicPr>
+        <p:blipFill>
+          <a:blip r:embed="rId2"/>
+          <a:stretch>
+            <a:fillRect/>
+          </a:stretch>
+        </p:blipFill>
+        <p:spPr>
+          <a:xfrm>
+            <a:off x="1272927" y="914271"/>
+            <a:ext cx="9646146" cy="5029458"/>
+          </a:xfrm>
+          <a:prstGeom prst="rect">
+            <a:avLst/>
+          </a:prstGeom>
+        </p:spPr>
+      </p:pic>
+      <p:sp>
+        <p:nvSpPr>
+          <p:cNvPr id="4" name="Rectangle 3">
+            <a:extLst>
+              <a:ext uri="{FF2B5EF4-FFF2-40B4-BE49-F238E27FC236}">
+                <a16:creationId xmlns:a16="http://schemas.microsoft.com/office/drawing/2014/main" id="{6BFFE94A-AC16-4296-ACFC-4398FAA730AB}"/>
+              </a:ext>
+            </a:extLst>
+          </p:cNvPr>
+          <p:cNvSpPr/>
+          <p:nvPr/>
+        </p:nvSpPr>
+        <p:spPr>
+          <a:xfrm>
+            <a:off x="2148579" y="5315691"/>
+            <a:ext cx="706382" cy="160549"/>
+          </a:xfrm>
+          <a:prstGeom prst="rect">
+            <a:avLst/>
+          </a:prstGeom>
+          <a:noFill/>
+          <a:ln w="38100">
+            <a:solidFill>
+              <a:srgbClr val="FF0000"/>
+            </a:solidFill>
+          </a:ln>
+        </p:spPr>
+        <p:style>
+          <a:lnRef idx="2">
+            <a:schemeClr val="accent1">
+              <a:shade val="50000"/>
+            </a:schemeClr>
+          </a:lnRef>
+          <a:fillRef idx="1">
+            <a:schemeClr val="accent1"/>
+          </a:fillRef>
+          <a:effectRef idx="0">
+            <a:schemeClr val="accent1"/>
+          </a:effectRef>
+          <a:fontRef idx="minor">
+            <a:schemeClr val="lt1"/>
+          </a:fontRef>
+        </p:style>
+        <p:txBody>
+          <a:bodyPr rtlCol="0" anchor="ctr"/>
+          <a:lstStyle/>
+          <a:p>
+            <a:pPr algn="ctr"/>
+            <a:endParaRPr lang="en-US"/>
+          </a:p>
+        </p:txBody>
+      </p:sp>
+      <p:sp>
+        <p:nvSpPr>
+          <p:cNvPr id="5" name="Arrow: Right 4">
+            <a:extLst>
+              <a:ext uri="{FF2B5EF4-FFF2-40B4-BE49-F238E27FC236}">
+                <a16:creationId xmlns:a16="http://schemas.microsoft.com/office/drawing/2014/main" id="{3CD5557E-33EB-4B04-96C2-58E707FF6FD2}"/>
+              </a:ext>
+            </a:extLst>
+          </p:cNvPr>
+          <p:cNvSpPr/>
+          <p:nvPr/>
+        </p:nvSpPr>
+        <p:spPr>
+          <a:xfrm rot="380170">
+            <a:off x="588613" y="5066666"/>
+            <a:ext cx="919320" cy="498050"/>
+          </a:xfrm>
+          <a:prstGeom prst="rightArrow">
+            <a:avLst/>
+          </a:prstGeom>
+          <a:noFill/>
+          <a:ln w="38100">
+            <a:solidFill>
+              <a:srgbClr val="FF0000"/>
+            </a:solidFill>
+          </a:ln>
+        </p:spPr>
+        <p:style>
+          <a:lnRef idx="2">
+            <a:schemeClr val="accent1">
+              <a:shade val="50000"/>
+            </a:schemeClr>
+          </a:lnRef>
+          <a:fillRef idx="1">
+            <a:schemeClr val="accent1"/>
+          </a:fillRef>
+          <a:effectRef idx="0">
+            <a:schemeClr val="accent1"/>
+          </a:effectRef>
+          <a:fontRef idx="minor">
+            <a:schemeClr val="lt1"/>
+          </a:fontRef>
+        </p:style>
+        <p:txBody>
+          <a:bodyPr rtlCol="0" anchor="ctr"/>
+          <a:lstStyle/>
+          <a:p>
+            <a:pPr algn="ctr"/>
+            <a:r>
+              <a:rPr lang="it-IT" dirty="0">
+                <a:solidFill>
+                  <a:srgbClr val="FF0000"/>
+                </a:solidFill>
+              </a:rPr>
+              <a:t>click</a:t>
+            </a:r>
+            <a:endParaRPr lang="en-US" dirty="0">
+              <a:solidFill>
+                <a:srgbClr val="FF0000"/>
+              </a:solidFill>
+            </a:endParaRPr>
+          </a:p>
+        </p:txBody>
+      </p:sp>
+    </p:spTree>
+    <p:extLst>
+      <p:ext uri="{BB962C8B-B14F-4D97-AF65-F5344CB8AC3E}">
+        <p14:creationId xmlns:p14="http://schemas.microsoft.com/office/powerpoint/2010/main" val="4198950319"/>
+      </p:ext>
+    </p:extLst>
+  </p:cSld>
+  <p:clrMapOvr>
+    <a:masterClrMapping/>
+  </p:clrMapOvr>
+</p:sld>
+</file>
+
+<file path=ppt/slides/slide24.xml><?xml version="1.0" encoding="utf-8"?>
+<p:sld xmlns:a="http://schemas.openxmlformats.org/drawingml/2006/main" xmlns:r="http://schemas.openxmlformats.org/officeDocument/2006/relationships" xmlns:p="http://schemas.openxmlformats.org/presentationml/2006/main">
+  <p:cSld>
+    <p:spTree>
+      <p:nvGrpSpPr>
+        <p:cNvPr id="1" name=""/>
+        <p:cNvGrpSpPr/>
+        <p:nvPr/>
+      </p:nvGrpSpPr>
+      <p:grpSpPr>
+        <a:xfrm>
+          <a:off x="0" y="0"/>
+          <a:ext cx="0" cy="0"/>
+          <a:chOff x="0" y="0"/>
+          <a:chExt cx="0" cy="0"/>
+        </a:xfrm>
+      </p:grpSpPr>
+      <p:pic>
+        <p:nvPicPr>
+          <p:cNvPr id="3" name="Picture 2">
+            <a:extLst>
+              <a:ext uri="{FF2B5EF4-FFF2-40B4-BE49-F238E27FC236}">
+                <a16:creationId xmlns:a16="http://schemas.microsoft.com/office/drawing/2014/main" id="{56859214-A811-4708-A980-E59CCA6AF6C6}"/>
+              </a:ext>
+            </a:extLst>
+          </p:cNvPr>
+          <p:cNvPicPr>
+            <a:picLocks noChangeAspect="1"/>
+          </p:cNvPicPr>
+          <p:nvPr/>
+        </p:nvPicPr>
+        <p:blipFill>
+          <a:blip r:embed="rId2"/>
+          <a:stretch>
+            <a:fillRect/>
+          </a:stretch>
+        </p:blipFill>
+        <p:spPr>
+          <a:xfrm>
+            <a:off x="1241175" y="952372"/>
+            <a:ext cx="9709649" cy="4953255"/>
+          </a:xfrm>
+          <a:prstGeom prst="rect">
+            <a:avLst/>
+          </a:prstGeom>
+        </p:spPr>
+      </p:pic>
+      <p:sp>
+        <p:nvSpPr>
+          <p:cNvPr id="4" name="Rectangle 3">
+            <a:extLst>
+              <a:ext uri="{FF2B5EF4-FFF2-40B4-BE49-F238E27FC236}">
+                <a16:creationId xmlns:a16="http://schemas.microsoft.com/office/drawing/2014/main" id="{F23E9C8F-4169-4598-921E-FE9A3BC54B60}"/>
+              </a:ext>
+            </a:extLst>
+          </p:cNvPr>
+          <p:cNvSpPr/>
+          <p:nvPr/>
+        </p:nvSpPr>
+        <p:spPr>
+          <a:xfrm>
+            <a:off x="1284978" y="2329443"/>
+            <a:ext cx="2545342" cy="180078"/>
+          </a:xfrm>
+          <a:prstGeom prst="rect">
+            <a:avLst/>
+          </a:prstGeom>
+          <a:noFill/>
+          <a:ln w="38100">
+            <a:solidFill>
+              <a:srgbClr val="FF0000"/>
+            </a:solidFill>
+          </a:ln>
+        </p:spPr>
+        <p:style>
+          <a:lnRef idx="2">
+            <a:schemeClr val="accent1">
+              <a:shade val="50000"/>
+            </a:schemeClr>
+          </a:lnRef>
+          <a:fillRef idx="1">
+            <a:schemeClr val="accent1"/>
+          </a:fillRef>
+          <a:effectRef idx="0">
+            <a:schemeClr val="accent1"/>
+          </a:effectRef>
+          <a:fontRef idx="minor">
+            <a:schemeClr val="lt1"/>
+          </a:fontRef>
+        </p:style>
+        <p:txBody>
+          <a:bodyPr rtlCol="0" anchor="ctr"/>
+          <a:lstStyle/>
+          <a:p>
+            <a:pPr algn="ctr"/>
+            <a:endParaRPr lang="en-US"/>
+          </a:p>
+        </p:txBody>
+      </p:sp>
+      <p:sp>
+        <p:nvSpPr>
+          <p:cNvPr id="6" name="Arrow: Right 5">
+            <a:extLst>
+              <a:ext uri="{FF2B5EF4-FFF2-40B4-BE49-F238E27FC236}">
+                <a16:creationId xmlns:a16="http://schemas.microsoft.com/office/drawing/2014/main" id="{04D50A3A-9D99-4C7A-805E-8BC4C8D27553}"/>
+              </a:ext>
+            </a:extLst>
+          </p:cNvPr>
+          <p:cNvSpPr/>
+          <p:nvPr/>
+        </p:nvSpPr>
+        <p:spPr>
+          <a:xfrm rot="380170">
+            <a:off x="192687" y="2080417"/>
+            <a:ext cx="919320" cy="498050"/>
+          </a:xfrm>
+          <a:prstGeom prst="rightArrow">
+            <a:avLst/>
+          </a:prstGeom>
+          <a:noFill/>
+          <a:ln w="38100">
+            <a:solidFill>
+              <a:srgbClr val="FF0000"/>
+            </a:solidFill>
+          </a:ln>
+        </p:spPr>
+        <p:style>
+          <a:lnRef idx="2">
+            <a:schemeClr val="accent1">
+              <a:shade val="50000"/>
+            </a:schemeClr>
+          </a:lnRef>
+          <a:fillRef idx="1">
+            <a:schemeClr val="accent1"/>
+          </a:fillRef>
+          <a:effectRef idx="0">
+            <a:schemeClr val="accent1"/>
+          </a:effectRef>
+          <a:fontRef idx="minor">
+            <a:schemeClr val="lt1"/>
+          </a:fontRef>
+        </p:style>
+        <p:txBody>
+          <a:bodyPr rtlCol="0" anchor="ctr"/>
+          <a:lstStyle/>
+          <a:p>
+            <a:pPr algn="ctr"/>
+            <a:r>
+              <a:rPr lang="it-IT" dirty="0">
+                <a:solidFill>
+                  <a:srgbClr val="FF0000"/>
+                </a:solidFill>
+              </a:rPr>
+              <a:t>copy</a:t>
+            </a:r>
+            <a:endParaRPr lang="en-US" dirty="0">
+              <a:solidFill>
+                <a:srgbClr val="FF0000"/>
+              </a:solidFill>
+            </a:endParaRPr>
+          </a:p>
+        </p:txBody>
+      </p:sp>
+    </p:spTree>
+    <p:extLst>
+      <p:ext uri="{BB962C8B-B14F-4D97-AF65-F5344CB8AC3E}">
+        <p14:creationId xmlns:p14="http://schemas.microsoft.com/office/powerpoint/2010/main" val="3735036972"/>
+      </p:ext>
+    </p:extLst>
+  </p:cSld>
+  <p:clrMapOvr>
+    <a:masterClrMapping/>
+  </p:clrMapOvr>
+</p:sld>
+</file>
+
+<file path=ppt/slides/slide25.xml><?xml version="1.0" encoding="utf-8"?>
+<p:sld xmlns:a="http://schemas.openxmlformats.org/drawingml/2006/main" xmlns:r="http://schemas.openxmlformats.org/officeDocument/2006/relationships" xmlns:p="http://schemas.openxmlformats.org/presentationml/2006/main">
+  <p:cSld>
+    <p:spTree>
+      <p:nvGrpSpPr>
+        <p:cNvPr id="1" name=""/>
+        <p:cNvGrpSpPr/>
+        <p:nvPr/>
+      </p:nvGrpSpPr>
+      <p:grpSpPr>
+        <a:xfrm>
+          <a:off x="0" y="0"/>
+          <a:ext cx="0" cy="0"/>
+          <a:chOff x="0" y="0"/>
+          <a:chExt cx="0" cy="0"/>
+        </a:xfrm>
+      </p:grpSpPr>
+      <p:pic>
+        <p:nvPicPr>
+          <p:cNvPr id="3" name="Picture 2">
+            <a:extLst>
+              <a:ext uri="{FF2B5EF4-FFF2-40B4-BE49-F238E27FC236}">
+                <a16:creationId xmlns:a16="http://schemas.microsoft.com/office/drawing/2014/main" id="{EB988955-EC5D-46D0-BF92-D44B5DF48A26}"/>
+              </a:ext>
+            </a:extLst>
+          </p:cNvPr>
+          <p:cNvPicPr>
+            <a:picLocks noChangeAspect="1"/>
+          </p:cNvPicPr>
+          <p:nvPr/>
+        </p:nvPicPr>
+        <p:blipFill rotWithShape="1">
+          <a:blip r:embed="rId2"/>
+          <a:srcRect b="37423"/>
+          <a:stretch/>
+        </p:blipFill>
+        <p:spPr>
+          <a:xfrm>
+            <a:off x="2054017" y="1638237"/>
+            <a:ext cx="8083965" cy="1541844"/>
+          </a:xfrm>
+          <a:prstGeom prst="rect">
+            <a:avLst/>
+          </a:prstGeom>
+        </p:spPr>
+      </p:pic>
+      <p:pic>
+        <p:nvPicPr>
+          <p:cNvPr id="4" name="Picture 3">
+            <a:extLst>
+              <a:ext uri="{FF2B5EF4-FFF2-40B4-BE49-F238E27FC236}">
+                <a16:creationId xmlns:a16="http://schemas.microsoft.com/office/drawing/2014/main" id="{9999DBB9-EEAF-474F-970D-406FA69631A6}"/>
+              </a:ext>
+            </a:extLst>
+          </p:cNvPr>
+          <p:cNvPicPr>
+            <a:picLocks noChangeAspect="1"/>
+          </p:cNvPicPr>
+          <p:nvPr/>
+        </p:nvPicPr>
+        <p:blipFill rotWithShape="1">
+          <a:blip r:embed="rId2"/>
+          <a:srcRect t="94328"/>
+          <a:stretch/>
+        </p:blipFill>
+        <p:spPr>
+          <a:xfrm>
+            <a:off x="2054016" y="3180081"/>
+            <a:ext cx="8083965" cy="139764"/>
+          </a:xfrm>
+          <a:prstGeom prst="rect">
+            <a:avLst/>
+          </a:prstGeom>
+        </p:spPr>
+      </p:pic>
+      <p:pic>
+        <p:nvPicPr>
+          <p:cNvPr id="6" name="Picture 5">
+            <a:extLst>
+              <a:ext uri="{FF2B5EF4-FFF2-40B4-BE49-F238E27FC236}">
+                <a16:creationId xmlns:a16="http://schemas.microsoft.com/office/drawing/2014/main" id="{19ACAF54-132C-400E-AFCD-4AC7B4FCF3A6}"/>
+              </a:ext>
+            </a:extLst>
+          </p:cNvPr>
+          <p:cNvPicPr>
+            <a:picLocks noChangeAspect="1"/>
+          </p:cNvPicPr>
+          <p:nvPr/>
+        </p:nvPicPr>
+        <p:blipFill>
+          <a:blip r:embed="rId3"/>
+          <a:stretch>
+            <a:fillRect/>
+          </a:stretch>
+        </p:blipFill>
+        <p:spPr>
+          <a:xfrm>
+            <a:off x="2054014" y="3573231"/>
+            <a:ext cx="8083968" cy="1769068"/>
+          </a:xfrm>
+          <a:prstGeom prst="rect">
+            <a:avLst/>
+          </a:prstGeom>
+        </p:spPr>
+      </p:pic>
+      <p:sp>
+        <p:nvSpPr>
+          <p:cNvPr id="7" name="Rectangle 6">
+            <a:extLst>
+              <a:ext uri="{FF2B5EF4-FFF2-40B4-BE49-F238E27FC236}">
+                <a16:creationId xmlns:a16="http://schemas.microsoft.com/office/drawing/2014/main" id="{9D0C8C5C-CD3E-4B14-9B66-CDDBEFCF341A}"/>
+              </a:ext>
+            </a:extLst>
+          </p:cNvPr>
+          <p:cNvSpPr/>
+          <p:nvPr/>
+        </p:nvSpPr>
+        <p:spPr>
+          <a:xfrm>
+            <a:off x="3811361" y="1638237"/>
+            <a:ext cx="5606016" cy="171709"/>
+          </a:xfrm>
+          <a:prstGeom prst="rect">
+            <a:avLst/>
+          </a:prstGeom>
+          <a:noFill/>
+          <a:ln w="38100">
+            <a:solidFill>
+              <a:srgbClr val="FF0000"/>
+            </a:solidFill>
+          </a:ln>
+        </p:spPr>
+        <p:style>
+          <a:lnRef idx="2">
+            <a:schemeClr val="accent1">
+              <a:shade val="50000"/>
+            </a:schemeClr>
+          </a:lnRef>
+          <a:fillRef idx="1">
+            <a:schemeClr val="accent1"/>
+          </a:fillRef>
+          <a:effectRef idx="0">
+            <a:schemeClr val="accent1"/>
+          </a:effectRef>
+          <a:fontRef idx="minor">
+            <a:schemeClr val="lt1"/>
+          </a:fontRef>
+        </p:style>
+        <p:txBody>
+          <a:bodyPr rtlCol="0" anchor="ctr"/>
+          <a:lstStyle/>
+          <a:p>
+            <a:pPr algn="ctr"/>
+            <a:endParaRPr lang="en-US"/>
+          </a:p>
+        </p:txBody>
+      </p:sp>
+      <p:sp>
+        <p:nvSpPr>
+          <p:cNvPr id="8" name="Rectangle 7">
+            <a:extLst>
+              <a:ext uri="{FF2B5EF4-FFF2-40B4-BE49-F238E27FC236}">
+                <a16:creationId xmlns:a16="http://schemas.microsoft.com/office/drawing/2014/main" id="{22CFF26D-3148-4C09-AED8-B0B1EEB09861}"/>
+              </a:ext>
+            </a:extLst>
+          </p:cNvPr>
+          <p:cNvSpPr/>
+          <p:nvPr/>
+        </p:nvSpPr>
+        <p:spPr>
+          <a:xfrm>
+            <a:off x="3878919" y="3140280"/>
+            <a:ext cx="3068636" cy="171709"/>
+          </a:xfrm>
+          <a:prstGeom prst="rect">
+            <a:avLst/>
+          </a:prstGeom>
+          <a:noFill/>
+          <a:ln w="38100">
+            <a:solidFill>
+              <a:srgbClr val="FF0000"/>
+            </a:solidFill>
+          </a:ln>
+        </p:spPr>
+        <p:style>
+          <a:lnRef idx="2">
+            <a:schemeClr val="accent1">
+              <a:shade val="50000"/>
+            </a:schemeClr>
+          </a:lnRef>
+          <a:fillRef idx="1">
+            <a:schemeClr val="accent1"/>
+          </a:fillRef>
+          <a:effectRef idx="0">
+            <a:schemeClr val="accent1"/>
+          </a:effectRef>
+          <a:fontRef idx="minor">
+            <a:schemeClr val="lt1"/>
+          </a:fontRef>
+        </p:style>
+        <p:txBody>
+          <a:bodyPr rtlCol="0" anchor="ctr"/>
+          <a:lstStyle/>
+          <a:p>
+            <a:pPr algn="ctr"/>
+            <a:endParaRPr lang="en-US"/>
+          </a:p>
+        </p:txBody>
+      </p:sp>
+      <p:sp>
+        <p:nvSpPr>
+          <p:cNvPr id="9" name="Rectangle 8">
+            <a:extLst>
+              <a:ext uri="{FF2B5EF4-FFF2-40B4-BE49-F238E27FC236}">
+                <a16:creationId xmlns:a16="http://schemas.microsoft.com/office/drawing/2014/main" id="{BA14C8F9-7190-4DA1-9395-7BBC57C4D16E}"/>
+              </a:ext>
+            </a:extLst>
+          </p:cNvPr>
+          <p:cNvSpPr/>
+          <p:nvPr/>
+        </p:nvSpPr>
+        <p:spPr>
+          <a:xfrm>
+            <a:off x="3539555" y="3573232"/>
+            <a:ext cx="4378960" cy="139764"/>
+          </a:xfrm>
+          <a:prstGeom prst="rect">
+            <a:avLst/>
+          </a:prstGeom>
+          <a:noFill/>
+          <a:ln w="38100">
+            <a:solidFill>
+              <a:srgbClr val="FF0000"/>
+            </a:solidFill>
+          </a:ln>
+        </p:spPr>
+        <p:style>
+          <a:lnRef idx="2">
+            <a:schemeClr val="accent1">
+              <a:shade val="50000"/>
+            </a:schemeClr>
+          </a:lnRef>
+          <a:fillRef idx="1">
+            <a:schemeClr val="accent1"/>
+          </a:fillRef>
+          <a:effectRef idx="0">
+            <a:schemeClr val="accent1"/>
+          </a:effectRef>
+          <a:fontRef idx="minor">
+            <a:schemeClr val="lt1"/>
+          </a:fontRef>
+        </p:style>
+        <p:txBody>
+          <a:bodyPr rtlCol="0" anchor="ctr"/>
+          <a:lstStyle/>
+          <a:p>
+            <a:pPr algn="ctr"/>
+            <a:endParaRPr lang="en-US"/>
+          </a:p>
+        </p:txBody>
+      </p:sp>
+    </p:spTree>
+    <p:extLst>
+      <p:ext uri="{BB962C8B-B14F-4D97-AF65-F5344CB8AC3E}">
+        <p14:creationId xmlns:p14="http://schemas.microsoft.com/office/powerpoint/2010/main" val="3426759580"/>
+      </p:ext>
+    </p:extLst>
+  </p:cSld>
+  <p:clrMapOvr>
+    <a:masterClrMapping/>
+  </p:clrMapOvr>
+</p:sld>
+</file>
+
+<file path=ppt/slides/slide26.xml><?xml version="1.0" encoding="utf-8"?>
+<p:sld xmlns:a="http://schemas.openxmlformats.org/drawingml/2006/main" xmlns:r="http://schemas.openxmlformats.org/officeDocument/2006/relationships" xmlns:p="http://schemas.openxmlformats.org/presentationml/2006/main">
+  <p:cSld>
+    <p:spTree>
+      <p:nvGrpSpPr>
+        <p:cNvPr id="1" name=""/>
+        <p:cNvGrpSpPr/>
+        <p:nvPr/>
+      </p:nvGrpSpPr>
+      <p:grpSpPr>
+        <a:xfrm>
+          <a:off x="0" y="0"/>
+          <a:ext cx="0" cy="0"/>
+          <a:chOff x="0" y="0"/>
+          <a:chExt cx="0" cy="0"/>
+        </a:xfrm>
+      </p:grpSpPr>
+      <p:pic>
+        <p:nvPicPr>
+          <p:cNvPr id="8" name="Picture 7">
+            <a:extLst>
+              <a:ext uri="{FF2B5EF4-FFF2-40B4-BE49-F238E27FC236}">
+                <a16:creationId xmlns:a16="http://schemas.microsoft.com/office/drawing/2014/main" id="{286F4236-19F5-49B1-8027-7E40A825BAD7}"/>
+              </a:ext>
+            </a:extLst>
+          </p:cNvPr>
+          <p:cNvPicPr>
+            <a:picLocks noChangeAspect="1"/>
+          </p:cNvPicPr>
+          <p:nvPr/>
+        </p:nvPicPr>
+        <p:blipFill>
+          <a:blip r:embed="rId2"/>
+          <a:stretch>
+            <a:fillRect/>
+          </a:stretch>
+        </p:blipFill>
+        <p:spPr>
+          <a:xfrm>
+            <a:off x="3017520" y="203537"/>
+            <a:ext cx="6156960" cy="6450926"/>
+          </a:xfrm>
+          <a:prstGeom prst="rect">
+            <a:avLst/>
+          </a:prstGeom>
+        </p:spPr>
+      </p:pic>
+      <p:sp>
+        <p:nvSpPr>
+          <p:cNvPr id="9" name="Rectangle 8">
+            <a:extLst>
+              <a:ext uri="{FF2B5EF4-FFF2-40B4-BE49-F238E27FC236}">
+                <a16:creationId xmlns:a16="http://schemas.microsoft.com/office/drawing/2014/main" id="{A4546008-C89F-4396-B041-DABB46948DA9}"/>
+              </a:ext>
+            </a:extLst>
+          </p:cNvPr>
+          <p:cNvSpPr/>
+          <p:nvPr/>
+        </p:nvSpPr>
+        <p:spPr>
+          <a:xfrm>
+            <a:off x="3017520" y="5220423"/>
+            <a:ext cx="4467362" cy="181136"/>
+          </a:xfrm>
+          <a:prstGeom prst="rect">
+            <a:avLst/>
+          </a:prstGeom>
+          <a:noFill/>
+          <a:ln w="38100">
+            <a:solidFill>
+              <a:srgbClr val="FF0000"/>
+            </a:solidFill>
+          </a:ln>
+        </p:spPr>
+        <p:style>
+          <a:lnRef idx="2">
+            <a:schemeClr val="accent1">
+              <a:shade val="50000"/>
+            </a:schemeClr>
+          </a:lnRef>
+          <a:fillRef idx="1">
+            <a:schemeClr val="accent1"/>
+          </a:fillRef>
+          <a:effectRef idx="0">
+            <a:schemeClr val="accent1"/>
+          </a:effectRef>
+          <a:fontRef idx="minor">
+            <a:schemeClr val="lt1"/>
+          </a:fontRef>
+        </p:style>
+        <p:txBody>
+          <a:bodyPr rtlCol="0" anchor="ctr"/>
+          <a:lstStyle/>
+          <a:p>
+            <a:pPr algn="ctr"/>
+            <a:endParaRPr lang="en-US"/>
+          </a:p>
+        </p:txBody>
+      </p:sp>
+    </p:spTree>
+    <p:extLst>
+      <p:ext uri="{BB962C8B-B14F-4D97-AF65-F5344CB8AC3E}">
+        <p14:creationId xmlns:p14="http://schemas.microsoft.com/office/powerpoint/2010/main" val="3443549195"/>
+      </p:ext>
+    </p:extLst>
+  </p:cSld>
+  <p:clrMapOvr>
+    <a:masterClrMapping/>
+  </p:clrMapOvr>
+</p:sld>
+</file>
+
 <file path=ppt/slides/slide3.xml><?xml version="1.0" encoding="utf-8"?>
 <p:sld xmlns:a="http://schemas.openxmlformats.org/drawingml/2006/main" xmlns:r="http://schemas.openxmlformats.org/officeDocument/2006/relationships" xmlns:p="http://schemas.openxmlformats.org/presentationml/2006/main">
   <p:cSld>

</xml_diff>